<commit_message>
Inclusão da etapa 4 da aula 7
</commit_message>
<xml_diff>
--- a/apresentacoes/Aula7/Etapa4/Etapa4.pptx
+++ b/apresentacoes/Aula7/Etapa4/Etapa4.pptx
@@ -6,7 +6,7 @@
     <p:sldMasterId id="2147483655" r:id="rId2"/>
   </p:sldMasterIdLst>
   <p:notesMasterIdLst>
-    <p:notesMasterId r:id="rId13"/>
+    <p:notesMasterId r:id="rId15"/>
   </p:notesMasterIdLst>
   <p:sldIdLst>
     <p:sldId id="258" r:id="rId3"/>
@@ -17,32 +17,34 @@
     <p:sldId id="290" r:id="rId8"/>
     <p:sldId id="291" r:id="rId9"/>
     <p:sldId id="292" r:id="rId10"/>
-    <p:sldId id="288" r:id="rId11"/>
-    <p:sldId id="262" r:id="rId12"/>
+    <p:sldId id="293" r:id="rId11"/>
+    <p:sldId id="295" r:id="rId12"/>
+    <p:sldId id="294" r:id="rId13"/>
+    <p:sldId id="262" r:id="rId14"/>
   </p:sldIdLst>
   <p:sldSz cx="9144000" cy="5143500" type="screen16x9"/>
   <p:notesSz cx="6858000" cy="9144000"/>
   <p:embeddedFontLst>
     <p:embeddedFont>
-      <p:font typeface="Calibri" panose="020F0502020204030204" pitchFamily="34" charset="0"/>
-      <p:regular r:id="rId14"/>
-      <p:bold r:id="rId15"/>
-      <p:italic r:id="rId16"/>
-      <p:boldItalic r:id="rId17"/>
-    </p:embeddedFont>
-    <p:embeddedFont>
       <p:font typeface="Century Gothic" panose="020B0502020202020204" pitchFamily="34" charset="0"/>
-      <p:regular r:id="rId18"/>
-      <p:bold r:id="rId19"/>
-      <p:italic r:id="rId20"/>
-      <p:boldItalic r:id="rId21"/>
+      <p:regular r:id="rId16"/>
+      <p:bold r:id="rId17"/>
+      <p:italic r:id="rId18"/>
+      <p:boldItalic r:id="rId19"/>
     </p:embeddedFont>
     <p:embeddedFont>
       <p:font typeface="Proxima Nova" panose="020B0604020202020204" charset="0"/>
-      <p:regular r:id="rId22"/>
-      <p:bold r:id="rId23"/>
-      <p:italic r:id="rId24"/>
-      <p:boldItalic r:id="rId25"/>
+      <p:regular r:id="rId20"/>
+      <p:bold r:id="rId21"/>
+      <p:italic r:id="rId22"/>
+      <p:boldItalic r:id="rId23"/>
+    </p:embeddedFont>
+    <p:embeddedFont>
+      <p:font typeface="Calibri" panose="020F0502020204030204" pitchFamily="34" charset="0"/>
+      <p:regular r:id="rId24"/>
+      <p:bold r:id="rId25"/>
+      <p:italic r:id="rId26"/>
+      <p:boldItalic r:id="rId27"/>
     </p:embeddedFont>
   </p:embeddedFontLst>
   <p:defaultTextStyle>
@@ -290,7 +292,7 @@
       </p15:sldGuideLst>
     </p:ext>
     <p:ext uri="http://customooxmlschemas.google.com/">
-      <go:slidesCustomData xmlns="" xmlns:mc="http://schemas.openxmlformats.org/markup-compatibility/2006" xmlns:mv="urn:schemas-microsoft-com:mac:vml" xmlns:c="http://schemas.openxmlformats.org/drawingml/2006/chart" xmlns:dgm="http://schemas.openxmlformats.org/drawingml/2006/diagram" xmlns:o="urn:schemas-microsoft-com:office:office" xmlns:v="urn:schemas-microsoft-com:vml" xmlns:pvml="urn:schemas-microsoft-com:office:powerpoint" xmlns:com="http://schemas.openxmlformats.org/drawingml/2006/compatibility" xmlns:p14="http://schemas.microsoft.com/office/powerpoint/2010/main" xmlns:p15="http://schemas.microsoft.com/office/powerpoint/2012/main" xmlns:ahyp="http://schemas.microsoft.com/office/drawing/2018/hyperlinkcolor" xmlns:go="http://customooxmlschemas.google.com/" r:id="rId34" roundtripDataSignature="AMtx7mij1fsZUe5V3lBG5qQcqOvrI5UhJw=="/>
+      <go:slidesCustomData xmlns:go="http://customooxmlschemas.google.com/" xmlns:ahyp="http://schemas.microsoft.com/office/drawing/2018/hyperlinkcolor" xmlns:p15="http://schemas.microsoft.com/office/powerpoint/2012/main" xmlns:p14="http://schemas.microsoft.com/office/powerpoint/2010/main" xmlns:com="http://schemas.openxmlformats.org/drawingml/2006/compatibility" xmlns:pvml="urn:schemas-microsoft-com:office:powerpoint" xmlns:v="urn:schemas-microsoft-com:vml" xmlns:o="urn:schemas-microsoft-com:office:office" xmlns:dgm="http://schemas.openxmlformats.org/drawingml/2006/diagram" xmlns:c="http://schemas.openxmlformats.org/drawingml/2006/chart" xmlns:mv="urn:schemas-microsoft-com:mac:vml" xmlns:mc="http://schemas.openxmlformats.org/markup-compatibility/2006" xmlns="" r:id="rId34" roundtripDataSignature="AMtx7mij1fsZUe5V3lBG5qQcqOvrI5UhJw=="/>
     </p:ext>
   </p:extLst>
 </p:presentation>
@@ -641,6 +643,11 @@
         </p:txBody>
       </p:sp>
     </p:spTree>
+    <p:extLst>
+      <p:ext uri="{BB962C8B-B14F-4D97-AF65-F5344CB8AC3E}">
+        <p14:creationId xmlns:p14="http://schemas.microsoft.com/office/powerpoint/2010/main" val="2451459570"/>
+      </p:ext>
+    </p:extLst>
   </p:cSld>
   <p:clrMap bg1="lt1" tx1="dk1" bg2="dk2" tx2="lt2" accent1="accent1" accent2="accent2" accent3="accent3" accent4="accent4" accent5="accent5" accent6="accent6" hlink="hlink" folHlink="folHlink"/>
   <p:notesStyle>
@@ -994,6 +1001,11 @@
         </p:txBody>
       </p:sp>
     </p:spTree>
+    <p:extLst>
+      <p:ext uri="{BB962C8B-B14F-4D97-AF65-F5344CB8AC3E}">
+        <p14:creationId xmlns:p14="http://schemas.microsoft.com/office/powerpoint/2010/main" val="695774113"/>
+      </p:ext>
+    </p:extLst>
   </p:cSld>
   <p:clrMapOvr>
     <a:masterClrMapping/>
@@ -1002,6 +1014,268 @@
 </file>
 
 <file path=ppt/notesSlides/notesSlide10.xml><?xml version="1.0" encoding="utf-8"?>
+<p:notes xmlns:a="http://schemas.openxmlformats.org/drawingml/2006/main" xmlns:r="http://schemas.openxmlformats.org/officeDocument/2006/relationships" xmlns:p="http://schemas.openxmlformats.org/presentationml/2006/main" showMasterSp="0" showMasterPhAnim="0">
+  <p:cSld>
+    <p:spTree>
+      <p:nvGrpSpPr>
+        <p:cNvPr id="1" name="Shape 132"/>
+        <p:cNvGrpSpPr/>
+        <p:nvPr/>
+      </p:nvGrpSpPr>
+      <p:grpSpPr>
+        <a:xfrm>
+          <a:off x="0" y="0"/>
+          <a:ext cx="0" cy="0"/>
+          <a:chOff x="0" y="0"/>
+          <a:chExt cx="0" cy="0"/>
+        </a:xfrm>
+      </p:grpSpPr>
+      <p:sp>
+        <p:nvSpPr>
+          <p:cNvPr id="133" name="Google Shape;133;p16:notes"/>
+          <p:cNvSpPr>
+            <a:spLocks noGrp="1" noRot="1" noChangeAspect="1"/>
+          </p:cNvSpPr>
+          <p:nvPr>
+            <p:ph type="sldImg" idx="2"/>
+          </p:nvPr>
+        </p:nvSpPr>
+        <p:spPr>
+          <a:xfrm>
+            <a:off x="381000" y="685800"/>
+            <a:ext cx="6096000" cy="3429000"/>
+          </a:xfrm>
+          <a:custGeom>
+            <a:avLst/>
+            <a:gdLst/>
+            <a:ahLst/>
+            <a:cxnLst/>
+            <a:rect l="l" t="t" r="r" b="b"/>
+            <a:pathLst>
+              <a:path w="120000" h="120000" extrusionOk="0">
+                <a:moveTo>
+                  <a:pt x="0" y="0"/>
+                </a:moveTo>
+                <a:lnTo>
+                  <a:pt x="120000" y="0"/>
+                </a:lnTo>
+                <a:lnTo>
+                  <a:pt x="120000" y="120000"/>
+                </a:lnTo>
+                <a:lnTo>
+                  <a:pt x="0" y="120000"/>
+                </a:lnTo>
+                <a:close/>
+              </a:path>
+            </a:pathLst>
+          </a:custGeom>
+          <a:noFill/>
+          <a:ln w="9525" cap="flat" cmpd="sng">
+            <a:solidFill>
+              <a:srgbClr val="000000"/>
+            </a:solidFill>
+            <a:prstDash val="solid"/>
+            <a:round/>
+            <a:headEnd type="none" w="sm" len="sm"/>
+            <a:tailEnd type="none" w="sm" len="sm"/>
+          </a:ln>
+        </p:spPr>
+      </p:sp>
+      <p:sp>
+        <p:nvSpPr>
+          <p:cNvPr id="134" name="Google Shape;134;p16:notes"/>
+          <p:cNvSpPr txBox="1">
+            <a:spLocks noGrp="1"/>
+          </p:cNvSpPr>
+          <p:nvPr>
+            <p:ph type="body" idx="1"/>
+          </p:nvPr>
+        </p:nvSpPr>
+        <p:spPr>
+          <a:xfrm>
+            <a:off x="685800" y="4343400"/>
+            <a:ext cx="5486400" cy="4114800"/>
+          </a:xfrm>
+          <a:prstGeom prst="rect">
+            <a:avLst/>
+          </a:prstGeom>
+          <a:noFill/>
+          <a:ln>
+            <a:noFill/>
+          </a:ln>
+        </p:spPr>
+        <p:txBody>
+          <a:bodyPr spcFirstLastPara="1" wrap="square" lIns="91425" tIns="91425" rIns="91425" bIns="91425" anchor="t" anchorCtr="0">
+            <a:noAutofit/>
+          </a:bodyPr>
+          <a:lstStyle/>
+          <a:p>
+            <a:pPr marL="0" lvl="0" indent="0" algn="l" rtl="0">
+              <a:lnSpc>
+                <a:spcPct val="100000"/>
+              </a:lnSpc>
+              <a:spcBef>
+                <a:spcPts val="0"/>
+              </a:spcBef>
+              <a:spcAft>
+                <a:spcPts val="0"/>
+              </a:spcAft>
+              <a:buClr>
+                <a:schemeClr val="dk1"/>
+              </a:buClr>
+              <a:buSzPts val="1100"/>
+              <a:buFont typeface="Arial"/>
+              <a:buNone/>
+            </a:pPr>
+            <a:endParaRPr/>
+          </a:p>
+        </p:txBody>
+      </p:sp>
+    </p:spTree>
+    <p:extLst>
+      <p:ext uri="{BB962C8B-B14F-4D97-AF65-F5344CB8AC3E}">
+        <p14:creationId xmlns:p14="http://schemas.microsoft.com/office/powerpoint/2010/main" val="3185405917"/>
+      </p:ext>
+    </p:extLst>
+  </p:cSld>
+  <p:clrMapOvr>
+    <a:masterClrMapping/>
+  </p:clrMapOvr>
+</p:notes>
+</file>
+
+<file path=ppt/notesSlides/notesSlide11.xml><?xml version="1.0" encoding="utf-8"?>
+<p:notes xmlns:a="http://schemas.openxmlformats.org/drawingml/2006/main" xmlns:r="http://schemas.openxmlformats.org/officeDocument/2006/relationships" xmlns:p="http://schemas.openxmlformats.org/presentationml/2006/main" showMasterSp="0" showMasterPhAnim="0">
+  <p:cSld>
+    <p:spTree>
+      <p:nvGrpSpPr>
+        <p:cNvPr id="1" name="Shape 132"/>
+        <p:cNvGrpSpPr/>
+        <p:nvPr/>
+      </p:nvGrpSpPr>
+      <p:grpSpPr>
+        <a:xfrm>
+          <a:off x="0" y="0"/>
+          <a:ext cx="0" cy="0"/>
+          <a:chOff x="0" y="0"/>
+          <a:chExt cx="0" cy="0"/>
+        </a:xfrm>
+      </p:grpSpPr>
+      <p:sp>
+        <p:nvSpPr>
+          <p:cNvPr id="133" name="Google Shape;133;p16:notes"/>
+          <p:cNvSpPr>
+            <a:spLocks noGrp="1" noRot="1" noChangeAspect="1"/>
+          </p:cNvSpPr>
+          <p:nvPr>
+            <p:ph type="sldImg" idx="2"/>
+          </p:nvPr>
+        </p:nvSpPr>
+        <p:spPr>
+          <a:xfrm>
+            <a:off x="381000" y="685800"/>
+            <a:ext cx="6096000" cy="3429000"/>
+          </a:xfrm>
+          <a:custGeom>
+            <a:avLst/>
+            <a:gdLst/>
+            <a:ahLst/>
+            <a:cxnLst/>
+            <a:rect l="l" t="t" r="r" b="b"/>
+            <a:pathLst>
+              <a:path w="120000" h="120000" extrusionOk="0">
+                <a:moveTo>
+                  <a:pt x="0" y="0"/>
+                </a:moveTo>
+                <a:lnTo>
+                  <a:pt x="120000" y="0"/>
+                </a:lnTo>
+                <a:lnTo>
+                  <a:pt x="120000" y="120000"/>
+                </a:lnTo>
+                <a:lnTo>
+                  <a:pt x="0" y="120000"/>
+                </a:lnTo>
+                <a:close/>
+              </a:path>
+            </a:pathLst>
+          </a:custGeom>
+          <a:noFill/>
+          <a:ln w="9525" cap="flat" cmpd="sng">
+            <a:solidFill>
+              <a:srgbClr val="000000"/>
+            </a:solidFill>
+            <a:prstDash val="solid"/>
+            <a:round/>
+            <a:headEnd type="none" w="sm" len="sm"/>
+            <a:tailEnd type="none" w="sm" len="sm"/>
+          </a:ln>
+        </p:spPr>
+      </p:sp>
+      <p:sp>
+        <p:nvSpPr>
+          <p:cNvPr id="134" name="Google Shape;134;p16:notes"/>
+          <p:cNvSpPr txBox="1">
+            <a:spLocks noGrp="1"/>
+          </p:cNvSpPr>
+          <p:nvPr>
+            <p:ph type="body" idx="1"/>
+          </p:nvPr>
+        </p:nvSpPr>
+        <p:spPr>
+          <a:xfrm>
+            <a:off x="685800" y="4343400"/>
+            <a:ext cx="5486400" cy="4114800"/>
+          </a:xfrm>
+          <a:prstGeom prst="rect">
+            <a:avLst/>
+          </a:prstGeom>
+          <a:noFill/>
+          <a:ln>
+            <a:noFill/>
+          </a:ln>
+        </p:spPr>
+        <p:txBody>
+          <a:bodyPr spcFirstLastPara="1" wrap="square" lIns="91425" tIns="91425" rIns="91425" bIns="91425" anchor="t" anchorCtr="0">
+            <a:noAutofit/>
+          </a:bodyPr>
+          <a:lstStyle/>
+          <a:p>
+            <a:pPr marL="0" lvl="0" indent="0" algn="l" rtl="0">
+              <a:lnSpc>
+                <a:spcPct val="100000"/>
+              </a:lnSpc>
+              <a:spcBef>
+                <a:spcPts val="0"/>
+              </a:spcBef>
+              <a:spcAft>
+                <a:spcPts val="0"/>
+              </a:spcAft>
+              <a:buClr>
+                <a:schemeClr val="dk1"/>
+              </a:buClr>
+              <a:buSzPts val="1100"/>
+              <a:buFont typeface="Arial"/>
+              <a:buNone/>
+            </a:pPr>
+            <a:endParaRPr/>
+          </a:p>
+        </p:txBody>
+      </p:sp>
+    </p:spTree>
+    <p:extLst>
+      <p:ext uri="{BB962C8B-B14F-4D97-AF65-F5344CB8AC3E}">
+        <p14:creationId xmlns:p14="http://schemas.microsoft.com/office/powerpoint/2010/main" val="192122699"/>
+      </p:ext>
+    </p:extLst>
+  </p:cSld>
+  <p:clrMapOvr>
+    <a:masterClrMapping/>
+  </p:clrMapOvr>
+</p:notes>
+</file>
+
+<file path=ppt/notesSlides/notesSlide12.xml><?xml version="1.0" encoding="utf-8"?>
 <p:notes xmlns:a="http://schemas.openxmlformats.org/drawingml/2006/main" xmlns:r="http://schemas.openxmlformats.org/officeDocument/2006/relationships" xmlns:p="http://schemas.openxmlformats.org/presentationml/2006/main" showMasterSp="0" showMasterPhAnim="0">
   <p:cSld>
     <p:spTree>
@@ -1124,6 +1398,11 @@
         </p:txBody>
       </p:sp>
     </p:spTree>
+    <p:extLst>
+      <p:ext uri="{BB962C8B-B14F-4D97-AF65-F5344CB8AC3E}">
+        <p14:creationId xmlns:p14="http://schemas.microsoft.com/office/powerpoint/2010/main" val="392416824"/>
+      </p:ext>
+    </p:extLst>
   </p:cSld>
   <p:clrMapOvr>
     <a:masterClrMapping/>
@@ -1250,6 +1529,11 @@
         </p:txBody>
       </p:sp>
     </p:spTree>
+    <p:extLst>
+      <p:ext uri="{BB962C8B-B14F-4D97-AF65-F5344CB8AC3E}">
+        <p14:creationId xmlns:p14="http://schemas.microsoft.com/office/powerpoint/2010/main" val="407199592"/>
+      </p:ext>
+    </p:extLst>
   </p:cSld>
   <p:clrMapOvr>
     <a:masterClrMapping/>
@@ -2164,7 +2448,7 @@
     </p:spTree>
     <p:extLst>
       <p:ext uri="{BB962C8B-B14F-4D97-AF65-F5344CB8AC3E}">
-        <p14:creationId xmlns:p14="http://schemas.microsoft.com/office/powerpoint/2010/main" val="3323381218"/>
+        <p14:creationId xmlns:p14="http://schemas.microsoft.com/office/powerpoint/2010/main" val="3270939189"/>
       </p:ext>
     </p:extLst>
   </p:cSld>
@@ -20980,6 +21264,750 @@
   <p:cSld>
     <p:spTree>
       <p:nvGrpSpPr>
+        <p:cNvPr id="1" name="Shape 135"/>
+        <p:cNvGrpSpPr/>
+        <p:nvPr/>
+      </p:nvGrpSpPr>
+      <p:grpSpPr>
+        <a:xfrm>
+          <a:off x="0" y="0"/>
+          <a:ext cx="0" cy="0"/>
+          <a:chOff x="0" y="0"/>
+          <a:chExt cx="0" cy="0"/>
+        </a:xfrm>
+      </p:grpSpPr>
+      <p:sp>
+        <p:nvSpPr>
+          <p:cNvPr id="136" name="Google Shape;136;p16"/>
+          <p:cNvSpPr txBox="1">
+            <a:spLocks noGrp="1"/>
+          </p:cNvSpPr>
+          <p:nvPr>
+            <p:ph type="subTitle" idx="1"/>
+          </p:nvPr>
+        </p:nvSpPr>
+        <p:spPr>
+          <a:xfrm>
+            <a:off x="1594625" y="243014"/>
+            <a:ext cx="5734294" cy="687626"/>
+          </a:xfrm>
+          <a:prstGeom prst="rect">
+            <a:avLst/>
+          </a:prstGeom>
+          <a:noFill/>
+          <a:ln>
+            <a:noFill/>
+          </a:ln>
+        </p:spPr>
+        <p:txBody>
+          <a:bodyPr spcFirstLastPara="1" wrap="square" lIns="91425" tIns="91425" rIns="91425" bIns="91425" anchor="ctr" anchorCtr="0">
+            <a:noAutofit/>
+          </a:bodyPr>
+          <a:lstStyle/>
+          <a:p>
+            <a:pPr marL="0" lvl="0" indent="0" algn="ctr" rtl="0">
+              <a:lnSpc>
+                <a:spcPct val="100000"/>
+              </a:lnSpc>
+              <a:spcBef>
+                <a:spcPts val="0"/>
+              </a:spcBef>
+              <a:spcAft>
+                <a:spcPts val="0"/>
+              </a:spcAft>
+              <a:buClr>
+                <a:schemeClr val="dk1"/>
+              </a:buClr>
+              <a:buSzPts val="1100"/>
+              <a:buFont typeface="Arial"/>
+              <a:buNone/>
+            </a:pPr>
+            <a:r>
+              <a:rPr lang="pt-BR" sz="4000" b="1" dirty="0" smtClean="0">
+                <a:solidFill>
+                  <a:srgbClr val="073763"/>
+                </a:solidFill>
+                <a:latin typeface="Century Gothic"/>
+                <a:ea typeface="Century Gothic"/>
+                <a:cs typeface="Century Gothic"/>
+                <a:sym typeface="Century Gothic"/>
+              </a:rPr>
+              <a:t>Exclusão</a:t>
+            </a:r>
+            <a:endParaRPr lang="pt-BR" sz="4000" b="1" dirty="0">
+              <a:solidFill>
+                <a:srgbClr val="073763"/>
+              </a:solidFill>
+              <a:latin typeface="Century Gothic"/>
+              <a:ea typeface="Century Gothic"/>
+              <a:cs typeface="Century Gothic"/>
+              <a:sym typeface="Century Gothic"/>
+            </a:endParaRPr>
+          </a:p>
+        </p:txBody>
+      </p:sp>
+      <p:pic>
+        <p:nvPicPr>
+          <p:cNvPr id="137" name="Google Shape;137;p16"/>
+          <p:cNvPicPr preferRelativeResize="0"/>
+          <p:nvPr/>
+        </p:nvPicPr>
+        <p:blipFill rotWithShape="1">
+          <a:blip r:embed="rId3">
+            <a:alphaModFix/>
+          </a:blip>
+          <a:srcRect/>
+          <a:stretch/>
+        </p:blipFill>
+        <p:spPr>
+          <a:xfrm>
+            <a:off x="311700" y="243014"/>
+            <a:ext cx="1698849" cy="591351"/>
+          </a:xfrm>
+          <a:prstGeom prst="rect">
+            <a:avLst/>
+          </a:prstGeom>
+          <a:noFill/>
+          <a:ln>
+            <a:noFill/>
+          </a:ln>
+        </p:spPr>
+      </p:pic>
+      <p:sp>
+        <p:nvSpPr>
+          <p:cNvPr id="139" name="Google Shape;139;p16"/>
+          <p:cNvSpPr/>
+          <p:nvPr/>
+        </p:nvSpPr>
+        <p:spPr>
+          <a:xfrm>
+            <a:off x="0" y="5077717"/>
+            <a:ext cx="9144000" cy="57300"/>
+          </a:xfrm>
+          <a:prstGeom prst="rect">
+            <a:avLst/>
+          </a:prstGeom>
+          <a:solidFill>
+            <a:srgbClr val="F78321"/>
+          </a:solidFill>
+          <a:ln w="9525" cap="flat" cmpd="sng">
+            <a:solidFill>
+              <a:srgbClr val="F78321"/>
+            </a:solidFill>
+            <a:prstDash val="solid"/>
+            <a:round/>
+            <a:headEnd type="none" w="sm" len="sm"/>
+            <a:tailEnd type="none" w="sm" len="sm"/>
+          </a:ln>
+        </p:spPr>
+        <p:txBody>
+          <a:bodyPr spcFirstLastPara="1" wrap="square" lIns="91425" tIns="91425" rIns="91425" bIns="91425" anchor="ctr" anchorCtr="0">
+            <a:noAutofit/>
+          </a:bodyPr>
+          <a:lstStyle/>
+          <a:p>
+            <a:pPr marL="0" marR="0" lvl="0" indent="0" algn="l" rtl="0">
+              <a:lnSpc>
+                <a:spcPct val="100000"/>
+              </a:lnSpc>
+              <a:spcBef>
+                <a:spcPts val="0"/>
+              </a:spcBef>
+              <a:spcAft>
+                <a:spcPts val="0"/>
+              </a:spcAft>
+              <a:buClr>
+                <a:srgbClr val="000000"/>
+              </a:buClr>
+              <a:buSzPts val="1400"/>
+              <a:buFont typeface="Arial"/>
+              <a:buNone/>
+            </a:pPr>
+            <a:endParaRPr sz="1400" b="0" i="0" u="none" strike="noStrike" cap="none">
+              <a:solidFill>
+                <a:srgbClr val="000000"/>
+              </a:solidFill>
+              <a:latin typeface="Arial"/>
+              <a:ea typeface="Arial"/>
+              <a:cs typeface="Arial"/>
+              <a:sym typeface="Arial"/>
+            </a:endParaRPr>
+          </a:p>
+        </p:txBody>
+      </p:sp>
+      <p:sp>
+        <p:nvSpPr>
+          <p:cNvPr id="10" name="CaixaDeTexto 9">
+            <a:extLst>
+              <a:ext uri="{FF2B5EF4-FFF2-40B4-BE49-F238E27FC236}">
+                <a16:creationId xmlns:a16="http://schemas.microsoft.com/office/drawing/2014/main" xmlns="" id="{880BA323-3898-4640-8B2C-7901D2BF9BC1}"/>
+              </a:ext>
+            </a:extLst>
+          </p:cNvPr>
+          <p:cNvSpPr txBox="1"/>
+          <p:nvPr/>
+        </p:nvSpPr>
+        <p:spPr>
+          <a:xfrm>
+            <a:off x="248688" y="1289776"/>
+            <a:ext cx="4873450" cy="1200329"/>
+          </a:xfrm>
+          <a:prstGeom prst="rect">
+            <a:avLst/>
+          </a:prstGeom>
+          <a:noFill/>
+        </p:spPr>
+        <p:txBody>
+          <a:bodyPr wrap="none" rtlCol="0">
+            <a:spAutoFit/>
+          </a:bodyPr>
+          <a:lstStyle/>
+          <a:p>
+            <a:r>
+              <a:rPr lang="pt-BR" sz="2400" dirty="0" smtClean="0">
+                <a:solidFill>
+                  <a:srgbClr val="002060"/>
+                </a:solidFill>
+                <a:latin typeface="Calibri" panose="020F0502020204030204" pitchFamily="34" charset="0"/>
+                <a:cs typeface="Calibri" panose="020F0502020204030204" pitchFamily="34" charset="0"/>
+              </a:rPr>
+              <a:t>Exclusão de um elemento</a:t>
+            </a:r>
+          </a:p>
+          <a:p>
+            <a:r>
+              <a:rPr lang="pt-BR" sz="2400" dirty="0" smtClean="0">
+                <a:solidFill>
+                  <a:srgbClr val="002060"/>
+                </a:solidFill>
+                <a:latin typeface="Calibri" panose="020F0502020204030204" pitchFamily="34" charset="0"/>
+                <a:cs typeface="Calibri" panose="020F0502020204030204" pitchFamily="34" charset="0"/>
+              </a:rPr>
+              <a:t>- Pega o maior elemento da esquerda</a:t>
+            </a:r>
+            <a:endParaRPr lang="pt-BR" sz="2400" dirty="0">
+              <a:solidFill>
+                <a:srgbClr val="002060"/>
+              </a:solidFill>
+              <a:latin typeface="Calibri" panose="020F0502020204030204" pitchFamily="34" charset="0"/>
+              <a:cs typeface="Calibri" panose="020F0502020204030204" pitchFamily="34" charset="0"/>
+            </a:endParaRPr>
+          </a:p>
+          <a:p>
+            <a:pPr marL="342900" indent="-342900">
+              <a:buFontTx/>
+              <a:buChar char="-"/>
+            </a:pPr>
+            <a:endParaRPr lang="pt-BR" sz="2400" dirty="0">
+              <a:solidFill>
+                <a:srgbClr val="002060"/>
+              </a:solidFill>
+              <a:latin typeface="Calibri" panose="020F0502020204030204" pitchFamily="34" charset="0"/>
+              <a:cs typeface="Calibri" panose="020F0502020204030204" pitchFamily="34" charset="0"/>
+            </a:endParaRPr>
+          </a:p>
+        </p:txBody>
+      </p:sp>
+      <p:pic>
+        <p:nvPicPr>
+          <p:cNvPr id="2" name="Imagem 1"/>
+          <p:cNvPicPr>
+            <a:picLocks noChangeAspect="1"/>
+          </p:cNvPicPr>
+          <p:nvPr/>
+        </p:nvPicPr>
+        <p:blipFill>
+          <a:blip r:embed="rId4"/>
+          <a:stretch>
+            <a:fillRect/>
+          </a:stretch>
+        </p:blipFill>
+        <p:spPr>
+          <a:xfrm>
+            <a:off x="248688" y="2274980"/>
+            <a:ext cx="6097503" cy="2293993"/>
+          </a:xfrm>
+          <a:prstGeom prst="rect">
+            <a:avLst/>
+          </a:prstGeom>
+        </p:spPr>
+      </p:pic>
+      <p:sp>
+        <p:nvSpPr>
+          <p:cNvPr id="8" name="Seta: para Baixo 4">
+            <a:extLst>
+              <a:ext uri="{FF2B5EF4-FFF2-40B4-BE49-F238E27FC236}">
+                <a16:creationId xmlns:a16="http://schemas.microsoft.com/office/drawing/2014/main" xmlns="" id="{CB6558F6-CCC0-4B88-948D-94FB3AC99AF9}"/>
+              </a:ext>
+            </a:extLst>
+          </p:cNvPr>
+          <p:cNvSpPr/>
+          <p:nvPr/>
+        </p:nvSpPr>
+        <p:spPr>
+          <a:xfrm rot="16200000">
+            <a:off x="746233" y="2782023"/>
+            <a:ext cx="442449" cy="769434"/>
+          </a:xfrm>
+          <a:prstGeom prst="downArrow">
+            <a:avLst/>
+          </a:prstGeom>
+          <a:solidFill>
+            <a:srgbClr val="FF0000"/>
+          </a:solidFill>
+          <a:ln>
+            <a:noFill/>
+          </a:ln>
+          <a:effectLst>
+            <a:outerShdw blurRad="44450" dist="27940" dir="5400000" algn="ctr">
+              <a:srgbClr val="000000">
+                <a:alpha val="32000"/>
+              </a:srgbClr>
+            </a:outerShdw>
+          </a:effectLst>
+          <a:scene3d>
+            <a:camera prst="orthographicFront">
+              <a:rot lat="0" lon="0" rev="0"/>
+            </a:camera>
+            <a:lightRig rig="balanced" dir="t">
+              <a:rot lat="0" lon="0" rev="8700000"/>
+            </a:lightRig>
+          </a:scene3d>
+          <a:sp3d>
+            <a:bevelT w="190500" h="38100"/>
+          </a:sp3d>
+        </p:spPr>
+        <p:style>
+          <a:lnRef idx="2">
+            <a:schemeClr val="accent1">
+              <a:shade val="50000"/>
+            </a:schemeClr>
+          </a:lnRef>
+          <a:fillRef idx="1">
+            <a:schemeClr val="accent1"/>
+          </a:fillRef>
+          <a:effectRef idx="0">
+            <a:schemeClr val="accent1"/>
+          </a:effectRef>
+          <a:fontRef idx="minor">
+            <a:schemeClr val="lt1"/>
+          </a:fontRef>
+        </p:style>
+        <p:txBody>
+          <a:bodyPr rtlCol="0" anchor="ctr"/>
+          <a:lstStyle/>
+          <a:p>
+            <a:pPr algn="ctr"/>
+            <a:endParaRPr lang="pt-BR"/>
+          </a:p>
+        </p:txBody>
+      </p:sp>
+      <p:sp>
+        <p:nvSpPr>
+          <p:cNvPr id="9" name="Seta: para Baixo 4">
+            <a:extLst>
+              <a:ext uri="{FF2B5EF4-FFF2-40B4-BE49-F238E27FC236}">
+                <a16:creationId xmlns:a16="http://schemas.microsoft.com/office/drawing/2014/main" xmlns="" id="{CB6558F6-CCC0-4B88-948D-94FB3AC99AF9}"/>
+              </a:ext>
+            </a:extLst>
+          </p:cNvPr>
+          <p:cNvSpPr/>
+          <p:nvPr/>
+        </p:nvSpPr>
+        <p:spPr>
+          <a:xfrm rot="16200000">
+            <a:off x="3548018" y="2956744"/>
+            <a:ext cx="442449" cy="769434"/>
+          </a:xfrm>
+          <a:prstGeom prst="downArrow">
+            <a:avLst/>
+          </a:prstGeom>
+          <a:solidFill>
+            <a:srgbClr val="FF0000"/>
+          </a:solidFill>
+          <a:ln>
+            <a:noFill/>
+          </a:ln>
+          <a:effectLst>
+            <a:outerShdw blurRad="44450" dist="27940" dir="5400000" algn="ctr">
+              <a:srgbClr val="000000">
+                <a:alpha val="32000"/>
+              </a:srgbClr>
+            </a:outerShdw>
+          </a:effectLst>
+          <a:scene3d>
+            <a:camera prst="orthographicFront">
+              <a:rot lat="0" lon="0" rev="0"/>
+            </a:camera>
+            <a:lightRig rig="balanced" dir="t">
+              <a:rot lat="0" lon="0" rev="8700000"/>
+            </a:lightRig>
+          </a:scene3d>
+          <a:sp3d>
+            <a:bevelT w="190500" h="38100"/>
+          </a:sp3d>
+        </p:spPr>
+        <p:style>
+          <a:lnRef idx="2">
+            <a:schemeClr val="accent1">
+              <a:shade val="50000"/>
+            </a:schemeClr>
+          </a:lnRef>
+          <a:fillRef idx="1">
+            <a:schemeClr val="accent1"/>
+          </a:fillRef>
+          <a:effectRef idx="0">
+            <a:schemeClr val="accent1"/>
+          </a:effectRef>
+          <a:fontRef idx="minor">
+            <a:schemeClr val="lt1"/>
+          </a:fontRef>
+        </p:style>
+        <p:txBody>
+          <a:bodyPr rtlCol="0" anchor="ctr"/>
+          <a:lstStyle/>
+          <a:p>
+            <a:pPr algn="ctr"/>
+            <a:endParaRPr lang="pt-BR"/>
+          </a:p>
+        </p:txBody>
+      </p:sp>
+    </p:spTree>
+    <p:extLst>
+      <p:ext uri="{BB962C8B-B14F-4D97-AF65-F5344CB8AC3E}">
+        <p14:creationId xmlns:p14="http://schemas.microsoft.com/office/powerpoint/2010/main" val="534309038"/>
+      </p:ext>
+    </p:extLst>
+  </p:cSld>
+  <p:clrMapOvr>
+    <a:masterClrMapping/>
+  </p:clrMapOvr>
+  <mc:AlternateContent xmlns:mc="http://schemas.openxmlformats.org/markup-compatibility/2006" xmlns:p14="http://schemas.microsoft.com/office/powerpoint/2010/main">
+    <mc:Choice Requires="p14">
+      <p:transition spd="med" p14:dur="700">
+        <p:fade/>
+      </p:transition>
+    </mc:Choice>
+    <mc:Fallback xmlns="">
+      <p:transition spd="med">
+        <p:fade/>
+      </p:transition>
+    </mc:Fallback>
+  </mc:AlternateContent>
+  <p:timing>
+    <p:tnLst>
+      <p:par>
+        <p:cTn id="1" dur="indefinite" restart="never" nodeType="tmRoot"/>
+      </p:par>
+    </p:tnLst>
+  </p:timing>
+</p:sld>
+</file>
+
+<file path=ppt/slides/slide11.xml><?xml version="1.0" encoding="utf-8"?>
+<p:sld xmlns:a="http://schemas.openxmlformats.org/drawingml/2006/main" xmlns:r="http://schemas.openxmlformats.org/officeDocument/2006/relationships" xmlns:p="http://schemas.openxmlformats.org/presentationml/2006/main">
+  <p:cSld>
+    <p:spTree>
+      <p:nvGrpSpPr>
+        <p:cNvPr id="1" name="Shape 135"/>
+        <p:cNvGrpSpPr/>
+        <p:nvPr/>
+      </p:nvGrpSpPr>
+      <p:grpSpPr>
+        <a:xfrm>
+          <a:off x="0" y="0"/>
+          <a:ext cx="0" cy="0"/>
+          <a:chOff x="0" y="0"/>
+          <a:chExt cx="0" cy="0"/>
+        </a:xfrm>
+      </p:grpSpPr>
+      <p:sp>
+        <p:nvSpPr>
+          <p:cNvPr id="136" name="Google Shape;136;p16"/>
+          <p:cNvSpPr txBox="1">
+            <a:spLocks noGrp="1"/>
+          </p:cNvSpPr>
+          <p:nvPr>
+            <p:ph type="subTitle" idx="1"/>
+          </p:nvPr>
+        </p:nvSpPr>
+        <p:spPr>
+          <a:xfrm>
+            <a:off x="1594625" y="243014"/>
+            <a:ext cx="5734294" cy="687626"/>
+          </a:xfrm>
+          <a:prstGeom prst="rect">
+            <a:avLst/>
+          </a:prstGeom>
+          <a:noFill/>
+          <a:ln>
+            <a:noFill/>
+          </a:ln>
+        </p:spPr>
+        <p:txBody>
+          <a:bodyPr spcFirstLastPara="1" wrap="square" lIns="91425" tIns="91425" rIns="91425" bIns="91425" anchor="ctr" anchorCtr="0">
+            <a:noAutofit/>
+          </a:bodyPr>
+          <a:lstStyle/>
+          <a:p>
+            <a:pPr marL="0" lvl="0" indent="0" algn="ctr" rtl="0">
+              <a:lnSpc>
+                <a:spcPct val="100000"/>
+              </a:lnSpc>
+              <a:spcBef>
+                <a:spcPts val="0"/>
+              </a:spcBef>
+              <a:spcAft>
+                <a:spcPts val="0"/>
+              </a:spcAft>
+              <a:buClr>
+                <a:schemeClr val="dk1"/>
+              </a:buClr>
+              <a:buSzPts val="1100"/>
+              <a:buFont typeface="Arial"/>
+              <a:buNone/>
+            </a:pPr>
+            <a:r>
+              <a:rPr lang="pt-BR" sz="4000" b="1" dirty="0" smtClean="0">
+                <a:solidFill>
+                  <a:srgbClr val="073763"/>
+                </a:solidFill>
+                <a:latin typeface="Century Gothic"/>
+                <a:ea typeface="Century Gothic"/>
+                <a:cs typeface="Century Gothic"/>
+                <a:sym typeface="Century Gothic"/>
+              </a:rPr>
+              <a:t>Exibição</a:t>
+            </a:r>
+            <a:endParaRPr lang="pt-BR" sz="4000" b="1" dirty="0">
+              <a:solidFill>
+                <a:srgbClr val="073763"/>
+              </a:solidFill>
+              <a:latin typeface="Century Gothic"/>
+              <a:ea typeface="Century Gothic"/>
+              <a:cs typeface="Century Gothic"/>
+              <a:sym typeface="Century Gothic"/>
+            </a:endParaRPr>
+          </a:p>
+        </p:txBody>
+      </p:sp>
+      <p:pic>
+        <p:nvPicPr>
+          <p:cNvPr id="137" name="Google Shape;137;p16"/>
+          <p:cNvPicPr preferRelativeResize="0"/>
+          <p:nvPr/>
+        </p:nvPicPr>
+        <p:blipFill rotWithShape="1">
+          <a:blip r:embed="rId3">
+            <a:alphaModFix/>
+          </a:blip>
+          <a:srcRect/>
+          <a:stretch/>
+        </p:blipFill>
+        <p:spPr>
+          <a:xfrm>
+            <a:off x="311700" y="243014"/>
+            <a:ext cx="1698849" cy="591351"/>
+          </a:xfrm>
+          <a:prstGeom prst="rect">
+            <a:avLst/>
+          </a:prstGeom>
+          <a:noFill/>
+          <a:ln>
+            <a:noFill/>
+          </a:ln>
+        </p:spPr>
+      </p:pic>
+      <p:sp>
+        <p:nvSpPr>
+          <p:cNvPr id="139" name="Google Shape;139;p16"/>
+          <p:cNvSpPr/>
+          <p:nvPr/>
+        </p:nvSpPr>
+        <p:spPr>
+          <a:xfrm>
+            <a:off x="0" y="5077717"/>
+            <a:ext cx="9144000" cy="57300"/>
+          </a:xfrm>
+          <a:prstGeom prst="rect">
+            <a:avLst/>
+          </a:prstGeom>
+          <a:solidFill>
+            <a:srgbClr val="F78321"/>
+          </a:solidFill>
+          <a:ln w="9525" cap="flat" cmpd="sng">
+            <a:solidFill>
+              <a:srgbClr val="F78321"/>
+            </a:solidFill>
+            <a:prstDash val="solid"/>
+            <a:round/>
+            <a:headEnd type="none" w="sm" len="sm"/>
+            <a:tailEnd type="none" w="sm" len="sm"/>
+          </a:ln>
+        </p:spPr>
+        <p:txBody>
+          <a:bodyPr spcFirstLastPara="1" wrap="square" lIns="91425" tIns="91425" rIns="91425" bIns="91425" anchor="ctr" anchorCtr="0">
+            <a:noAutofit/>
+          </a:bodyPr>
+          <a:lstStyle/>
+          <a:p>
+            <a:pPr marL="0" marR="0" lvl="0" indent="0" algn="l" rtl="0">
+              <a:lnSpc>
+                <a:spcPct val="100000"/>
+              </a:lnSpc>
+              <a:spcBef>
+                <a:spcPts val="0"/>
+              </a:spcBef>
+              <a:spcAft>
+                <a:spcPts val="0"/>
+              </a:spcAft>
+              <a:buClr>
+                <a:srgbClr val="000000"/>
+              </a:buClr>
+              <a:buSzPts val="1400"/>
+              <a:buFont typeface="Arial"/>
+              <a:buNone/>
+            </a:pPr>
+            <a:endParaRPr sz="1400" b="0" i="0" u="none" strike="noStrike" cap="none">
+              <a:solidFill>
+                <a:srgbClr val="000000"/>
+              </a:solidFill>
+              <a:latin typeface="Arial"/>
+              <a:ea typeface="Arial"/>
+              <a:cs typeface="Arial"/>
+              <a:sym typeface="Arial"/>
+            </a:endParaRPr>
+          </a:p>
+        </p:txBody>
+      </p:sp>
+      <p:sp>
+        <p:nvSpPr>
+          <p:cNvPr id="10" name="CaixaDeTexto 9">
+            <a:extLst>
+              <a:ext uri="{FF2B5EF4-FFF2-40B4-BE49-F238E27FC236}">
+                <a16:creationId xmlns:a16="http://schemas.microsoft.com/office/drawing/2014/main" xmlns="" id="{880BA323-3898-4640-8B2C-7901D2BF9BC1}"/>
+              </a:ext>
+            </a:extLst>
+          </p:cNvPr>
+          <p:cNvSpPr txBox="1"/>
+          <p:nvPr/>
+        </p:nvSpPr>
+        <p:spPr>
+          <a:xfrm>
+            <a:off x="248688" y="1289776"/>
+            <a:ext cx="2707793" cy="830997"/>
+          </a:xfrm>
+          <a:prstGeom prst="rect">
+            <a:avLst/>
+          </a:prstGeom>
+          <a:noFill/>
+        </p:spPr>
+        <p:txBody>
+          <a:bodyPr wrap="none" rtlCol="0">
+            <a:spAutoFit/>
+          </a:bodyPr>
+          <a:lstStyle/>
+          <a:p>
+            <a:r>
+              <a:rPr lang="pt-BR" sz="2400" dirty="0" smtClean="0">
+                <a:solidFill>
+                  <a:srgbClr val="002060"/>
+                </a:solidFill>
+                <a:latin typeface="Calibri" panose="020F0502020204030204" pitchFamily="34" charset="0"/>
+                <a:cs typeface="Calibri" panose="020F0502020204030204" pitchFamily="34" charset="0"/>
+              </a:rPr>
+              <a:t>Algoritmo Recursivo</a:t>
+            </a:r>
+            <a:endParaRPr lang="pt-BR" sz="2400" dirty="0">
+              <a:solidFill>
+                <a:srgbClr val="002060"/>
+              </a:solidFill>
+              <a:latin typeface="Calibri" panose="020F0502020204030204" pitchFamily="34" charset="0"/>
+              <a:cs typeface="Calibri" panose="020F0502020204030204" pitchFamily="34" charset="0"/>
+            </a:endParaRPr>
+          </a:p>
+          <a:p>
+            <a:pPr marL="342900" indent="-342900">
+              <a:buFontTx/>
+              <a:buChar char="-"/>
+            </a:pPr>
+            <a:endParaRPr lang="pt-BR" sz="2400" dirty="0">
+              <a:solidFill>
+                <a:srgbClr val="002060"/>
+              </a:solidFill>
+              <a:latin typeface="Calibri" panose="020F0502020204030204" pitchFamily="34" charset="0"/>
+              <a:cs typeface="Calibri" panose="020F0502020204030204" pitchFamily="34" charset="0"/>
+            </a:endParaRPr>
+          </a:p>
+        </p:txBody>
+      </p:sp>
+      <p:pic>
+        <p:nvPicPr>
+          <p:cNvPr id="3" name="Imagem 2"/>
+          <p:cNvPicPr>
+            <a:picLocks noChangeAspect="1"/>
+          </p:cNvPicPr>
+          <p:nvPr/>
+        </p:nvPicPr>
+        <p:blipFill>
+          <a:blip r:embed="rId4">
+            <a:extLst>
+              <a:ext uri="{28A0092B-C50C-407E-A947-70E740481C1C}">
+                <a14:useLocalDpi xmlns:a14="http://schemas.microsoft.com/office/drawing/2010/main" val="0"/>
+              </a:ext>
+            </a:extLst>
+          </a:blip>
+          <a:stretch>
+            <a:fillRect/>
+          </a:stretch>
+        </p:blipFill>
+        <p:spPr>
+          <a:xfrm>
+            <a:off x="81643" y="1843120"/>
+            <a:ext cx="5034643" cy="2799638"/>
+          </a:xfrm>
+          <a:prstGeom prst="rect">
+            <a:avLst/>
+          </a:prstGeom>
+        </p:spPr>
+      </p:pic>
+    </p:spTree>
+    <p:extLst>
+      <p:ext uri="{BB962C8B-B14F-4D97-AF65-F5344CB8AC3E}">
+        <p14:creationId xmlns:p14="http://schemas.microsoft.com/office/powerpoint/2010/main" val="450757912"/>
+      </p:ext>
+    </p:extLst>
+  </p:cSld>
+  <p:clrMapOvr>
+    <a:masterClrMapping/>
+  </p:clrMapOvr>
+  <mc:AlternateContent xmlns:mc="http://schemas.openxmlformats.org/markup-compatibility/2006" xmlns:p14="http://schemas.microsoft.com/office/powerpoint/2010/main">
+    <mc:Choice Requires="p14">
+      <p:transition spd="med" p14:dur="700">
+        <p:fade/>
+      </p:transition>
+    </mc:Choice>
+    <mc:Fallback xmlns="">
+      <p:transition spd="med">
+        <p:fade/>
+      </p:transition>
+    </mc:Fallback>
+  </mc:AlternateContent>
+  <p:timing>
+    <p:tnLst>
+      <p:par>
+        <p:cTn id="1" dur="indefinite" restart="never" nodeType="tmRoot"/>
+      </p:par>
+    </p:tnLst>
+  </p:timing>
+</p:sld>
+</file>
+
+<file path=ppt/slides/slide12.xml><?xml version="1.0" encoding="utf-8"?>
+<p:sld xmlns:a="http://schemas.openxmlformats.org/drawingml/2006/main" xmlns:r="http://schemas.openxmlformats.org/officeDocument/2006/relationships" xmlns:p="http://schemas.openxmlformats.org/presentationml/2006/main">
+  <p:cSld>
+    <p:spTree>
+      <p:nvGrpSpPr>
         <p:cNvPr id="1" name="Shape 164"/>
         <p:cNvGrpSpPr/>
         <p:nvPr/>
@@ -21768,7 +22796,7 @@
                 <a:hlinkClick r:id="rId4">
                   <a:extLst>
                     <a:ext uri="{A12FA001-AC4F-418D-AE19-62706E023703}">
-                      <ahyp:hlinkClr xmlns:ahyp="http://schemas.microsoft.com/office/drawing/2018/hyperlinkcolor" val="tx"/>
+                      <ahyp:hlinkClr xmlns:ahyp="http://schemas.microsoft.com/office/drawing/2018/hyperlinkcolor" xmlns="" val="tx"/>
                     </a:ext>
                   </a:extLst>
                 </a:hlinkClick>
@@ -21792,7 +22820,7 @@
           <p:cNvPr id="14" name="Imagem 13">
             <a:extLst>
               <a:ext uri="{FF2B5EF4-FFF2-40B4-BE49-F238E27FC236}">
-                <a16:creationId xmlns:a16="http://schemas.microsoft.com/office/drawing/2014/main" id="{75728100-D2C6-4D0B-BE34-B066BE471AF3}"/>
+                <a16:creationId xmlns:a16="http://schemas.microsoft.com/office/drawing/2014/main" xmlns="" id="{75728100-D2C6-4D0B-BE34-B066BE471AF3}"/>
               </a:ext>
             </a:extLst>
           </p:cNvPr>
@@ -21828,7 +22856,7 @@
         <p:fade/>
       </p:transition>
     </mc:Choice>
-    <mc:Fallback xmlns="" xmlns:mv="urn:schemas-microsoft-com:mac:vml" xmlns:c="http://schemas.openxmlformats.org/drawingml/2006/chart" xmlns:dgm="http://schemas.openxmlformats.org/drawingml/2006/diagram" xmlns:o="urn:schemas-microsoft-com:office:office" xmlns:v="urn:schemas-microsoft-com:vml" xmlns:pvml="urn:schemas-microsoft-com:office:powerpoint" xmlns:com="http://schemas.openxmlformats.org/drawingml/2006/compatibility" xmlns:p15="http://schemas.microsoft.com/office/powerpoint/2012/main" xmlns:ahyp="http://schemas.microsoft.com/office/drawing/2018/hyperlinkcolor">
+    <mc:Fallback xmlns:ahyp="http://schemas.microsoft.com/office/drawing/2018/hyperlinkcolor" xmlns:p15="http://schemas.microsoft.com/office/powerpoint/2012/main" xmlns:com="http://schemas.openxmlformats.org/drawingml/2006/compatibility" xmlns:pvml="urn:schemas-microsoft-com:office:powerpoint" xmlns:v="urn:schemas-microsoft-com:vml" xmlns:o="urn:schemas-microsoft-com:office:office" xmlns:dgm="http://schemas.openxmlformats.org/drawingml/2006/diagram" xmlns:c="http://schemas.openxmlformats.org/drawingml/2006/chart" xmlns:mv="urn:schemas-microsoft-com:mac:vml" xmlns="">
       <p:transition spd="slow">
         <p:fade/>
       </p:transition>
@@ -22601,7 +23629,7 @@
         <p:fade/>
       </p:transition>
     </mc:Choice>
-    <mc:Fallback xmlns:ahyp="http://schemas.microsoft.com/office/drawing/2018/hyperlinkcolor" xmlns:p15="http://schemas.microsoft.com/office/powerpoint/2012/main" xmlns:com="http://schemas.openxmlformats.org/drawingml/2006/compatibility" xmlns:pvml="urn:schemas-microsoft-com:office:powerpoint" xmlns:v="urn:schemas-microsoft-com:vml" xmlns:o="urn:schemas-microsoft-com:office:office" xmlns:dgm="http://schemas.openxmlformats.org/drawingml/2006/diagram" xmlns:c="http://schemas.openxmlformats.org/drawingml/2006/chart" xmlns:mv="urn:schemas-microsoft-com:mac:vml" xmlns="">
+    <mc:Fallback xmlns="" xmlns:mv="urn:schemas-microsoft-com:mac:vml" xmlns:c="http://schemas.openxmlformats.org/drawingml/2006/chart" xmlns:dgm="http://schemas.openxmlformats.org/drawingml/2006/diagram" xmlns:o="urn:schemas-microsoft-com:office:office" xmlns:v="urn:schemas-microsoft-com:vml" xmlns:pvml="urn:schemas-microsoft-com:office:powerpoint" xmlns:com="http://schemas.openxmlformats.org/drawingml/2006/compatibility" xmlns:p15="http://schemas.microsoft.com/office/powerpoint/2012/main" xmlns:ahyp="http://schemas.microsoft.com/office/drawing/2018/hyperlinkcolor">
       <p:transition spd="slow">
         <p:fade/>
       </p:transition>
@@ -23140,7 +24168,7 @@
           <p:cNvPr id="4" name="Imagem 3">
             <a:extLst>
               <a:ext uri="{FF2B5EF4-FFF2-40B4-BE49-F238E27FC236}">
-                <a16:creationId xmlns:a16="http://schemas.microsoft.com/office/drawing/2014/main" id="{7CBDA6C0-40C9-4A6E-A6EA-87F71FEC9E49}"/>
+                <a16:creationId xmlns:a16="http://schemas.microsoft.com/office/drawing/2014/main" xmlns="" id="{7CBDA6C0-40C9-4A6E-A6EA-87F71FEC9E49}"/>
               </a:ext>
             </a:extLst>
           </p:cNvPr>
@@ -23181,7 +24209,7 @@
         <p:fade/>
       </p:transition>
     </mc:Choice>
-    <mc:Fallback xmlns="" xmlns:mv="urn:schemas-microsoft-com:mac:vml" xmlns:c="http://schemas.openxmlformats.org/drawingml/2006/chart" xmlns:dgm="http://schemas.openxmlformats.org/drawingml/2006/diagram" xmlns:o="urn:schemas-microsoft-com:office:office" xmlns:v="urn:schemas-microsoft-com:vml" xmlns:pvml="urn:schemas-microsoft-com:office:powerpoint" xmlns:com="http://schemas.openxmlformats.org/drawingml/2006/compatibility" xmlns:p15="http://schemas.microsoft.com/office/powerpoint/2012/main" xmlns:ahyp="http://schemas.microsoft.com/office/drawing/2018/hyperlinkcolor">
+    <mc:Fallback xmlns:ahyp="http://schemas.microsoft.com/office/drawing/2018/hyperlinkcolor" xmlns:p15="http://schemas.microsoft.com/office/powerpoint/2012/main" xmlns:com="http://schemas.openxmlformats.org/drawingml/2006/compatibility" xmlns:pvml="urn:schemas-microsoft-com:office:powerpoint" xmlns:v="urn:schemas-microsoft-com:vml" xmlns:o="urn:schemas-microsoft-com:office:office" xmlns:dgm="http://schemas.openxmlformats.org/drawingml/2006/diagram" xmlns:c="http://schemas.openxmlformats.org/drawingml/2006/chart" xmlns:mv="urn:schemas-microsoft-com:mac:vml" xmlns="">
       <p:transition spd="slow">
         <p:fade/>
       </p:transition>
@@ -23362,7 +24390,7 @@
           <p:cNvPr id="5" name="Imagem 4">
             <a:extLst>
               <a:ext uri="{FF2B5EF4-FFF2-40B4-BE49-F238E27FC236}">
-                <a16:creationId xmlns:a16="http://schemas.microsoft.com/office/drawing/2014/main" id="{42132828-D80F-4811-96F0-3E5F40559D4B}"/>
+                <a16:creationId xmlns:a16="http://schemas.microsoft.com/office/drawing/2014/main" xmlns="" id="{42132828-D80F-4811-96F0-3E5F40559D4B}"/>
               </a:ext>
             </a:extLst>
           </p:cNvPr>
@@ -23392,7 +24420,7 @@
           <p:cNvPr id="11" name="CaixaDeTexto 10">
             <a:extLst>
               <a:ext uri="{FF2B5EF4-FFF2-40B4-BE49-F238E27FC236}">
-                <a16:creationId xmlns:a16="http://schemas.microsoft.com/office/drawing/2014/main" id="{880BA323-3898-4640-8B2C-7901D2BF9BC1}"/>
+                <a16:creationId xmlns:a16="http://schemas.microsoft.com/office/drawing/2014/main" xmlns="" id="{880BA323-3898-4640-8B2C-7901D2BF9BC1}"/>
               </a:ext>
             </a:extLst>
           </p:cNvPr>
@@ -23511,6 +24539,13 @@
       </p:transition>
     </mc:Fallback>
   </mc:AlternateContent>
+  <p:timing>
+    <p:tnLst>
+      <p:par>
+        <p:cTn id="1" dur="indefinite" restart="never" nodeType="tmRoot"/>
+      </p:par>
+    </p:tnLst>
+  </p:timing>
 </p:sld>
 </file>
 
@@ -23686,7 +24721,7 @@
           <p:cNvPr id="5" name="Imagem 4">
             <a:extLst>
               <a:ext uri="{FF2B5EF4-FFF2-40B4-BE49-F238E27FC236}">
-                <a16:creationId xmlns:a16="http://schemas.microsoft.com/office/drawing/2014/main" id="{42132828-D80F-4811-96F0-3E5F40559D4B}"/>
+                <a16:creationId xmlns:a16="http://schemas.microsoft.com/office/drawing/2014/main" xmlns="" id="{42132828-D80F-4811-96F0-3E5F40559D4B}"/>
               </a:ext>
             </a:extLst>
           </p:cNvPr>
@@ -23716,7 +24751,7 @@
           <p:cNvPr id="11" name="CaixaDeTexto 10">
             <a:extLst>
               <a:ext uri="{FF2B5EF4-FFF2-40B4-BE49-F238E27FC236}">
-                <a16:creationId xmlns:a16="http://schemas.microsoft.com/office/drawing/2014/main" id="{880BA323-3898-4640-8B2C-7901D2BF9BC1}"/>
+                <a16:creationId xmlns:a16="http://schemas.microsoft.com/office/drawing/2014/main" xmlns="" id="{880BA323-3898-4640-8B2C-7901D2BF9BC1}"/>
               </a:ext>
             </a:extLst>
           </p:cNvPr>
@@ -23802,7 +24837,7 @@
           <p:cNvPr id="3" name="Imagem 2">
             <a:extLst>
               <a:ext uri="{FF2B5EF4-FFF2-40B4-BE49-F238E27FC236}">
-                <a16:creationId xmlns:a16="http://schemas.microsoft.com/office/drawing/2014/main" id="{72BA7EA5-B639-4FAA-8F56-C222397906EF}"/>
+                <a16:creationId xmlns:a16="http://schemas.microsoft.com/office/drawing/2014/main" xmlns="" id="{72BA7EA5-B639-4FAA-8F56-C222397906EF}"/>
               </a:ext>
             </a:extLst>
           </p:cNvPr>
@@ -24094,7 +25129,7 @@
           <p:cNvPr id="5" name="Imagem 4">
             <a:extLst>
               <a:ext uri="{FF2B5EF4-FFF2-40B4-BE49-F238E27FC236}">
-                <a16:creationId xmlns:a16="http://schemas.microsoft.com/office/drawing/2014/main" id="{42132828-D80F-4811-96F0-3E5F40559D4B}"/>
+                <a16:creationId xmlns:a16="http://schemas.microsoft.com/office/drawing/2014/main" xmlns="" id="{42132828-D80F-4811-96F0-3E5F40559D4B}"/>
               </a:ext>
             </a:extLst>
           </p:cNvPr>
@@ -24124,7 +25159,7 @@
           <p:cNvPr id="11" name="CaixaDeTexto 10">
             <a:extLst>
               <a:ext uri="{FF2B5EF4-FFF2-40B4-BE49-F238E27FC236}">
-                <a16:creationId xmlns:a16="http://schemas.microsoft.com/office/drawing/2014/main" id="{880BA323-3898-4640-8B2C-7901D2BF9BC1}"/>
+                <a16:creationId xmlns:a16="http://schemas.microsoft.com/office/drawing/2014/main" xmlns="" id="{880BA323-3898-4640-8B2C-7901D2BF9BC1}"/>
               </a:ext>
             </a:extLst>
           </p:cNvPr>
@@ -24210,7 +25245,7 @@
           <p:cNvPr id="8" name="Imagem 7">
             <a:extLst>
               <a:ext uri="{FF2B5EF4-FFF2-40B4-BE49-F238E27FC236}">
-                <a16:creationId xmlns:a16="http://schemas.microsoft.com/office/drawing/2014/main" id="{E528385E-48C7-4F3A-8F39-FA92552F6556}"/>
+                <a16:creationId xmlns:a16="http://schemas.microsoft.com/office/drawing/2014/main" xmlns="" id="{E528385E-48C7-4F3A-8F39-FA92552F6556}"/>
               </a:ext>
             </a:extLst>
           </p:cNvPr>
@@ -24502,7 +25537,7 @@
           <p:cNvPr id="5" name="Imagem 4">
             <a:extLst>
               <a:ext uri="{FF2B5EF4-FFF2-40B4-BE49-F238E27FC236}">
-                <a16:creationId xmlns:a16="http://schemas.microsoft.com/office/drawing/2014/main" id="{42132828-D80F-4811-96F0-3E5F40559D4B}"/>
+                <a16:creationId xmlns:a16="http://schemas.microsoft.com/office/drawing/2014/main" xmlns="" id="{42132828-D80F-4811-96F0-3E5F40559D4B}"/>
               </a:ext>
             </a:extLst>
           </p:cNvPr>
@@ -24532,7 +25567,7 @@
           <p:cNvPr id="11" name="CaixaDeTexto 10">
             <a:extLst>
               <a:ext uri="{FF2B5EF4-FFF2-40B4-BE49-F238E27FC236}">
-                <a16:creationId xmlns:a16="http://schemas.microsoft.com/office/drawing/2014/main" id="{880BA323-3898-4640-8B2C-7901D2BF9BC1}"/>
+                <a16:creationId xmlns:a16="http://schemas.microsoft.com/office/drawing/2014/main" xmlns="" id="{880BA323-3898-4640-8B2C-7901D2BF9BC1}"/>
               </a:ext>
             </a:extLst>
           </p:cNvPr>
@@ -24618,7 +25653,7 @@
           <p:cNvPr id="9" name="Imagem 8">
             <a:extLst>
               <a:ext uri="{FF2B5EF4-FFF2-40B4-BE49-F238E27FC236}">
-                <a16:creationId xmlns:a16="http://schemas.microsoft.com/office/drawing/2014/main" id="{73F70D3A-158E-4EBD-A1E0-2CAE2963C29F}"/>
+                <a16:creationId xmlns:a16="http://schemas.microsoft.com/office/drawing/2014/main" xmlns="" id="{73F70D3A-158E-4EBD-A1E0-2CAE2963C29F}"/>
               </a:ext>
             </a:extLst>
           </p:cNvPr>
@@ -24760,7 +25795,7 @@
           <p:cNvPr id="5" name="Imagem 4">
             <a:extLst>
               <a:ext uri="{FF2B5EF4-FFF2-40B4-BE49-F238E27FC236}">
-                <a16:creationId xmlns:a16="http://schemas.microsoft.com/office/drawing/2014/main" id="{42132828-D80F-4811-96F0-3E5F40559D4B}"/>
+                <a16:creationId xmlns:a16="http://schemas.microsoft.com/office/drawing/2014/main" xmlns="" id="{42132828-D80F-4811-96F0-3E5F40559D4B}"/>
               </a:ext>
             </a:extLst>
           </p:cNvPr>
@@ -24790,7 +25825,7 @@
           <p:cNvPr id="3" name="Conector reto 2">
             <a:extLst>
               <a:ext uri="{FF2B5EF4-FFF2-40B4-BE49-F238E27FC236}">
-                <a16:creationId xmlns:a16="http://schemas.microsoft.com/office/drawing/2014/main" id="{C7FEA8D8-EC1C-46B5-B370-166FDE8AA185}"/>
+                <a16:creationId xmlns:a16="http://schemas.microsoft.com/office/drawing/2014/main" xmlns="" id="{C7FEA8D8-EC1C-46B5-B370-166FDE8AA185}"/>
               </a:ext>
             </a:extLst>
           </p:cNvPr>
@@ -24976,7 +26011,7 @@
           <p:cNvPr id="11" name="CaixaDeTexto 10">
             <a:extLst>
               <a:ext uri="{FF2B5EF4-FFF2-40B4-BE49-F238E27FC236}">
-                <a16:creationId xmlns:a16="http://schemas.microsoft.com/office/drawing/2014/main" id="{880BA323-3898-4640-8B2C-7901D2BF9BC1}"/>
+                <a16:creationId xmlns:a16="http://schemas.microsoft.com/office/drawing/2014/main" xmlns="" id="{880BA323-3898-4640-8B2C-7901D2BF9BC1}"/>
               </a:ext>
             </a:extLst>
           </p:cNvPr>
@@ -25062,7 +26097,7 @@
           <p:cNvPr id="8" name="Imagem 7">
             <a:extLst>
               <a:ext uri="{FF2B5EF4-FFF2-40B4-BE49-F238E27FC236}">
-                <a16:creationId xmlns:a16="http://schemas.microsoft.com/office/drawing/2014/main" id="{3FF2D893-B130-4E92-95F7-568D9AB97EB0}"/>
+                <a16:creationId xmlns:a16="http://schemas.microsoft.com/office/drawing/2014/main" xmlns="" id="{3FF2D893-B130-4E92-95F7-568D9AB97EB0}"/>
               </a:ext>
             </a:extLst>
           </p:cNvPr>
@@ -25290,7 +26325,7 @@
               <a:buNone/>
             </a:pPr>
             <a:r>
-              <a:rPr lang="pt-BR" sz="4000" b="1" dirty="0">
+              <a:rPr lang="pt-BR" sz="4000" b="1" dirty="0" smtClean="0">
                 <a:solidFill>
                   <a:srgbClr val="073763"/>
                 </a:solidFill>
@@ -25299,8 +26334,17 @@
                 <a:cs typeface="Century Gothic"/>
                 <a:sym typeface="Century Gothic"/>
               </a:rPr>
-              <a:t>Nó da Árvore Binária</a:t>
+              <a:t>Exclusão</a:t>
             </a:r>
+            <a:endParaRPr lang="pt-BR" sz="4000" b="1" dirty="0">
+              <a:solidFill>
+                <a:srgbClr val="073763"/>
+              </a:solidFill>
+              <a:latin typeface="Century Gothic"/>
+              <a:ea typeface="Century Gothic"/>
+              <a:cs typeface="Century Gothic"/>
+              <a:sym typeface="Century Gothic"/>
+            </a:endParaRPr>
           </a:p>
         </p:txBody>
       </p:sp>
@@ -25393,15 +26437,82 @@
           </a:p>
         </p:txBody>
       </p:sp>
-      <p:pic>
-        <p:nvPicPr>
-          <p:cNvPr id="4" name="Imagem 3">
+      <p:sp>
+        <p:nvSpPr>
+          <p:cNvPr id="10" name="CaixaDeTexto 9">
             <a:extLst>
               <a:ext uri="{FF2B5EF4-FFF2-40B4-BE49-F238E27FC236}">
-                <a16:creationId xmlns:a16="http://schemas.microsoft.com/office/drawing/2014/main" id="{142F5BEA-8394-4BB0-9A00-547916C4DA83}"/>
+                <a16:creationId xmlns:a16="http://schemas.microsoft.com/office/drawing/2014/main" xmlns="" id="{880BA323-3898-4640-8B2C-7901D2BF9BC1}"/>
               </a:ext>
             </a:extLst>
           </p:cNvPr>
+          <p:cNvSpPr txBox="1"/>
+          <p:nvPr/>
+        </p:nvSpPr>
+        <p:spPr>
+          <a:xfrm>
+            <a:off x="248688" y="1289776"/>
+            <a:ext cx="4873450" cy="1200329"/>
+          </a:xfrm>
+          <a:prstGeom prst="rect">
+            <a:avLst/>
+          </a:prstGeom>
+          <a:noFill/>
+        </p:spPr>
+        <p:txBody>
+          <a:bodyPr wrap="none" rtlCol="0">
+            <a:spAutoFit/>
+          </a:bodyPr>
+          <a:lstStyle/>
+          <a:p>
+            <a:r>
+              <a:rPr lang="pt-BR" sz="2400" dirty="0" smtClean="0">
+                <a:solidFill>
+                  <a:srgbClr val="002060"/>
+                </a:solidFill>
+                <a:latin typeface="Calibri" panose="020F0502020204030204" pitchFamily="34" charset="0"/>
+                <a:cs typeface="Calibri" panose="020F0502020204030204" pitchFamily="34" charset="0"/>
+              </a:rPr>
+              <a:t>Exclusão da raiz</a:t>
+            </a:r>
+          </a:p>
+          <a:p>
+            <a:r>
+              <a:rPr lang="pt-BR" sz="2400" dirty="0" smtClean="0">
+                <a:solidFill>
+                  <a:srgbClr val="002060"/>
+                </a:solidFill>
+                <a:latin typeface="Calibri" panose="020F0502020204030204" pitchFamily="34" charset="0"/>
+                <a:cs typeface="Calibri" panose="020F0502020204030204" pitchFamily="34" charset="0"/>
+              </a:rPr>
+              <a:t>- Pega o maior elemento da esquerda</a:t>
+            </a:r>
+            <a:endParaRPr lang="pt-BR" sz="2400" dirty="0">
+              <a:solidFill>
+                <a:srgbClr val="002060"/>
+              </a:solidFill>
+              <a:latin typeface="Calibri" panose="020F0502020204030204" pitchFamily="34" charset="0"/>
+              <a:cs typeface="Calibri" panose="020F0502020204030204" pitchFamily="34" charset="0"/>
+            </a:endParaRPr>
+          </a:p>
+          <a:p>
+            <a:pPr marL="342900" indent="-342900">
+              <a:buFontTx/>
+              <a:buChar char="-"/>
+            </a:pPr>
+            <a:endParaRPr lang="pt-BR" sz="2400" dirty="0">
+              <a:solidFill>
+                <a:srgbClr val="002060"/>
+              </a:solidFill>
+              <a:latin typeface="Calibri" panose="020F0502020204030204" pitchFamily="34" charset="0"/>
+              <a:cs typeface="Calibri" panose="020F0502020204030204" pitchFamily="34" charset="0"/>
+            </a:endParaRPr>
+          </a:p>
+        </p:txBody>
+      </p:sp>
+      <p:pic>
+        <p:nvPicPr>
+          <p:cNvPr id="4" name="Imagem 3"/>
           <p:cNvPicPr>
             <a:picLocks noChangeAspect="1"/>
           </p:cNvPicPr>
@@ -25415,38 +26526,8 @@
         </p:blipFill>
         <p:spPr>
           <a:xfrm>
-            <a:off x="3710" y="827221"/>
-            <a:ext cx="5319024" cy="4095285"/>
-          </a:xfrm>
-          <a:prstGeom prst="rect">
-            <a:avLst/>
-          </a:prstGeom>
-        </p:spPr>
-      </p:pic>
-      <p:pic>
-        <p:nvPicPr>
-          <p:cNvPr id="6" name="Imagem 5">
-            <a:extLst>
-              <a:ext uri="{FF2B5EF4-FFF2-40B4-BE49-F238E27FC236}">
-                <a16:creationId xmlns:a16="http://schemas.microsoft.com/office/drawing/2014/main" id="{D43EA2E3-8282-48C4-8AA3-F2F1224335AB}"/>
-              </a:ext>
-            </a:extLst>
-          </p:cNvPr>
-          <p:cNvPicPr>
-            <a:picLocks noChangeAspect="1"/>
-          </p:cNvPicPr>
-          <p:nvPr/>
-        </p:nvPicPr>
-        <p:blipFill>
-          <a:blip r:embed="rId5"/>
-          <a:stretch>
-            <a:fillRect/>
-          </a:stretch>
-        </p:blipFill>
-        <p:spPr>
-          <a:xfrm>
-            <a:off x="5138231" y="1360449"/>
-            <a:ext cx="1612978" cy="1773044"/>
+            <a:off x="241352" y="2341750"/>
+            <a:ext cx="6325483" cy="2353003"/>
           </a:xfrm>
           <a:prstGeom prst="rect">
             <a:avLst/>
@@ -25455,58 +26536,10 @@
       </p:pic>
       <p:sp>
         <p:nvSpPr>
-          <p:cNvPr id="8" name="CaixaDeTexto 7">
+          <p:cNvPr id="12" name="Seta: para Baixo 4">
             <a:extLst>
               <a:ext uri="{FF2B5EF4-FFF2-40B4-BE49-F238E27FC236}">
-                <a16:creationId xmlns:a16="http://schemas.microsoft.com/office/drawing/2014/main" id="{9B5D7884-78EC-45AD-9804-A12FE0FB0CE7}"/>
-              </a:ext>
-            </a:extLst>
-          </p:cNvPr>
-          <p:cNvSpPr txBox="1"/>
-          <p:nvPr/>
-        </p:nvSpPr>
-        <p:spPr>
-          <a:xfrm>
-            <a:off x="5322734" y="1691546"/>
-            <a:ext cx="1199367" cy="400110"/>
-          </a:xfrm>
-          <a:prstGeom prst="rect">
-            <a:avLst/>
-          </a:prstGeom>
-          <a:noFill/>
-        </p:spPr>
-        <p:txBody>
-          <a:bodyPr wrap="none" rtlCol="0">
-            <a:spAutoFit/>
-          </a:bodyPr>
-          <a:lstStyle/>
-          <a:p>
-            <a:r>
-              <a:rPr lang="pt-BR" sz="2000" b="1" dirty="0" err="1">
-                <a:solidFill>
-                  <a:srgbClr val="3D3D3C"/>
-                </a:solidFill>
-                <a:latin typeface="Calibri" panose="020F0502020204030204" pitchFamily="34" charset="0"/>
-                <a:cs typeface="Calibri" panose="020F0502020204030204" pitchFamily="34" charset="0"/>
-              </a:rPr>
-              <a:t>conteudo</a:t>
-            </a:r>
-            <a:endParaRPr lang="pt-BR" sz="2000" b="1" dirty="0">
-              <a:solidFill>
-                <a:srgbClr val="3D3D3C"/>
-              </a:solidFill>
-              <a:latin typeface="Calibri" panose="020F0502020204030204" pitchFamily="34" charset="0"/>
-              <a:cs typeface="Calibri" panose="020F0502020204030204" pitchFamily="34" charset="0"/>
-            </a:endParaRPr>
-          </a:p>
-        </p:txBody>
-      </p:sp>
-      <p:sp>
-        <p:nvSpPr>
-          <p:cNvPr id="5" name="Seta: para Baixo 4">
-            <a:extLst>
-              <a:ext uri="{FF2B5EF4-FFF2-40B4-BE49-F238E27FC236}">
-                <a16:creationId xmlns:a16="http://schemas.microsoft.com/office/drawing/2014/main" id="{CB6558F6-CCC0-4B88-948D-94FB3AC99AF9}"/>
+                <a16:creationId xmlns:a16="http://schemas.microsoft.com/office/drawing/2014/main" xmlns="" id="{CB6558F6-CCC0-4B88-948D-94FB3AC99AF9}"/>
               </a:ext>
             </a:extLst>
           </p:cNvPr>
@@ -25514,8 +26547,78 @@
           <p:nvPr/>
         </p:nvSpPr>
         <p:spPr>
-          <a:xfrm>
-            <a:off x="3603086" y="1163022"/>
+          <a:xfrm rot="16200000">
+            <a:off x="1324617" y="2267127"/>
+            <a:ext cx="442449" cy="769434"/>
+          </a:xfrm>
+          <a:prstGeom prst="downArrow">
+            <a:avLst/>
+          </a:prstGeom>
+          <a:solidFill>
+            <a:srgbClr val="FF0000"/>
+          </a:solidFill>
+          <a:ln>
+            <a:noFill/>
+          </a:ln>
+          <a:effectLst>
+            <a:outerShdw blurRad="44450" dist="27940" dir="5400000" algn="ctr">
+              <a:srgbClr val="000000">
+                <a:alpha val="32000"/>
+              </a:srgbClr>
+            </a:outerShdw>
+          </a:effectLst>
+          <a:scene3d>
+            <a:camera prst="orthographicFront">
+              <a:rot lat="0" lon="0" rev="0"/>
+            </a:camera>
+            <a:lightRig rig="balanced" dir="t">
+              <a:rot lat="0" lon="0" rev="8700000"/>
+            </a:lightRig>
+          </a:scene3d>
+          <a:sp3d>
+            <a:bevelT w="190500" h="38100"/>
+          </a:sp3d>
+        </p:spPr>
+        <p:style>
+          <a:lnRef idx="2">
+            <a:schemeClr val="accent1">
+              <a:shade val="50000"/>
+            </a:schemeClr>
+          </a:lnRef>
+          <a:fillRef idx="1">
+            <a:schemeClr val="accent1"/>
+          </a:fillRef>
+          <a:effectRef idx="0">
+            <a:schemeClr val="accent1"/>
+          </a:effectRef>
+          <a:fontRef idx="minor">
+            <a:schemeClr val="lt1"/>
+          </a:fontRef>
+        </p:style>
+        <p:txBody>
+          <a:bodyPr rtlCol="0" anchor="ctr"/>
+          <a:lstStyle/>
+          <a:p>
+            <a:pPr algn="ctr"/>
+            <a:endParaRPr lang="pt-BR"/>
+          </a:p>
+        </p:txBody>
+      </p:sp>
+      <p:sp>
+        <p:nvSpPr>
+          <p:cNvPr id="13" name="Seta: para Baixo 4">
+            <a:extLst>
+              <a:ext uri="{FF2B5EF4-FFF2-40B4-BE49-F238E27FC236}">
+                <a16:creationId xmlns:a16="http://schemas.microsoft.com/office/drawing/2014/main" xmlns="" id="{CB6558F6-CCC0-4B88-948D-94FB3AC99AF9}"/>
+              </a:ext>
+            </a:extLst>
+          </p:cNvPr>
+          <p:cNvSpPr/>
+          <p:nvPr/>
+        </p:nvSpPr>
+        <p:spPr>
+          <a:xfrm rot="16200000">
+            <a:off x="4240548" y="2217739"/>
             <a:ext cx="442449" cy="769434"/>
           </a:xfrm>
           <a:prstGeom prst="downArrow">
@@ -25574,7 +26677,7 @@
     </p:spTree>
     <p:extLst>
       <p:ext uri="{BB962C8B-B14F-4D97-AF65-F5344CB8AC3E}">
-        <p14:creationId xmlns:p14="http://schemas.microsoft.com/office/powerpoint/2010/main" val="4218799013"/>
+        <p14:creationId xmlns:p14="http://schemas.microsoft.com/office/powerpoint/2010/main" val="2273755173"/>
       </p:ext>
     </p:extLst>
   </p:cSld>
@@ -25593,6 +26696,13 @@
       </p:transition>
     </mc:Fallback>
   </mc:AlternateContent>
+  <p:timing>
+    <p:tnLst>
+      <p:par>
+        <p:cTn id="1" dur="indefinite" restart="never" nodeType="tmRoot"/>
+      </p:par>
+    </p:tnLst>
+  </p:timing>
 </p:sld>
 </file>
 

</xml_diff>